<commit_message>
Deployed 09165e3 with MkDocs version: 1.1.2
</commit_message>
<xml_diff>
--- a/img/time-of-flight-angle.pptx
+++ b/img/time-of-flight-angle.pptx
@@ -7,6 +7,8 @@
   <p:sldIdLst>
     <p:sldId id="256" r:id="rId2"/>
     <p:sldId id="257" r:id="rId3"/>
+    <p:sldId id="258" r:id="rId4"/>
+    <p:sldId id="259" r:id="rId5"/>
   </p:sldIdLst>
   <p:sldSz cx="12192000" cy="6858000"/>
   <p:notesSz cx="6858000" cy="9144000"/>
@@ -3126,6 +3128,265 @@
 </p:sld>
 </file>
 
+<file path=ppt/slides/slide3.xml><?xml version="1.0" encoding="utf-8"?>
+<p:sld xmlns:a="http://schemas.openxmlformats.org/drawingml/2006/main" xmlns:r="http://schemas.openxmlformats.org/officeDocument/2006/relationships" xmlns:p="http://schemas.openxmlformats.org/presentationml/2006/main">
+  <p:cSld>
+    <p:spTree>
+      <p:nvGrpSpPr>
+        <p:cNvPr id="1" name=""/>
+        <p:cNvGrpSpPr/>
+        <p:nvPr/>
+      </p:nvGrpSpPr>
+      <p:grpSpPr>
+        <a:xfrm>
+          <a:off x="0" y="0"/>
+          <a:ext cx="0" cy="0"/>
+          <a:chOff x="0" y="0"/>
+          <a:chExt cx="0" cy="0"/>
+        </a:xfrm>
+      </p:grpSpPr>
+      <p:sp>
+        <p:nvSpPr>
+          <p:cNvPr id="2" name="Title 1">
+            <a:extLst>
+              <a:ext uri="{FF2B5EF4-FFF2-40B4-BE49-F238E27FC236}">
+                <a16:creationId xmlns:a16="http://schemas.microsoft.com/office/drawing/2014/main" id="{E6D5C9DA-15AC-4446-A00D-732EADF3D7F7}"/>
+              </a:ext>
+            </a:extLst>
+          </p:cNvPr>
+          <p:cNvSpPr>
+            <a:spLocks noGrp="1"/>
+          </p:cNvSpPr>
+          <p:nvPr>
+            <p:ph type="title"/>
+          </p:nvPr>
+        </p:nvSpPr>
+        <p:spPr/>
+        <p:txBody>
+          <a:bodyPr/>
+          <a:lstStyle/>
+          <a:p>
+            <a:endParaRPr lang="en-US"/>
+          </a:p>
+        </p:txBody>
+      </p:sp>
+      <p:sp>
+        <p:nvSpPr>
+          <p:cNvPr id="3" name="Content Placeholder 2">
+            <a:extLst>
+              <a:ext uri="{FF2B5EF4-FFF2-40B4-BE49-F238E27FC236}">
+                <a16:creationId xmlns:a16="http://schemas.microsoft.com/office/drawing/2014/main" id="{C8EDF2C2-2FE5-FD4B-98F5-624CA2C8BD94}"/>
+              </a:ext>
+            </a:extLst>
+          </p:cNvPr>
+          <p:cNvSpPr>
+            <a:spLocks noGrp="1"/>
+          </p:cNvSpPr>
+          <p:nvPr>
+            <p:ph idx="1"/>
+          </p:nvPr>
+        </p:nvSpPr>
+        <p:spPr>
+          <a:xfrm>
+            <a:off x="838200" y="6135329"/>
+            <a:ext cx="10515600" cy="309717"/>
+          </a:xfrm>
+        </p:spPr>
+        <p:txBody>
+          <a:bodyPr/>
+          <a:lstStyle/>
+          <a:p>
+            <a:endParaRPr lang="en-US" dirty="0"/>
+          </a:p>
+        </p:txBody>
+      </p:sp>
+      <p:pic>
+        <p:nvPicPr>
+          <p:cNvPr id="5" name="Picture 4" descr="A picture containing adapter&#10;&#10;Description automatically generated">
+            <a:extLst>
+              <a:ext uri="{FF2B5EF4-FFF2-40B4-BE49-F238E27FC236}">
+                <a16:creationId xmlns:a16="http://schemas.microsoft.com/office/drawing/2014/main" id="{102ED191-EA50-8C42-80F5-05726C45DA64}"/>
+              </a:ext>
+            </a:extLst>
+          </p:cNvPr>
+          <p:cNvPicPr>
+            <a:picLocks noChangeAspect="1"/>
+          </p:cNvPicPr>
+          <p:nvPr/>
+        </p:nvPicPr>
+        <p:blipFill>
+          <a:blip r:embed="rId2"/>
+          <a:stretch>
+            <a:fillRect/>
+          </a:stretch>
+        </p:blipFill>
+        <p:spPr>
+          <a:xfrm>
+            <a:off x="1707253" y="2020527"/>
+            <a:ext cx="4043581" cy="3303640"/>
+          </a:xfrm>
+          <a:prstGeom prst="rect">
+            <a:avLst/>
+          </a:prstGeom>
+        </p:spPr>
+      </p:pic>
+      <p:pic>
+        <p:nvPicPr>
+          <p:cNvPr id="7" name="Picture 6" descr="A picture containing black, electronics, camera, adapter&#10;&#10;Description automatically generated">
+            <a:extLst>
+              <a:ext uri="{FF2B5EF4-FFF2-40B4-BE49-F238E27FC236}">
+                <a16:creationId xmlns:a16="http://schemas.microsoft.com/office/drawing/2014/main" id="{EC994CE1-5805-6D4C-9DE3-BDFA5DD37831}"/>
+              </a:ext>
+            </a:extLst>
+          </p:cNvPr>
+          <p:cNvPicPr>
+            <a:picLocks noChangeAspect="1"/>
+          </p:cNvPicPr>
+          <p:nvPr/>
+        </p:nvPicPr>
+        <p:blipFill rotWithShape="1">
+          <a:blip r:embed="rId3"/>
+          <a:srcRect l="12725"/>
+          <a:stretch/>
+        </p:blipFill>
+        <p:spPr>
+          <a:xfrm>
+            <a:off x="6607277" y="1991033"/>
+            <a:ext cx="3810002" cy="3274141"/>
+          </a:xfrm>
+          <a:prstGeom prst="rect">
+            <a:avLst/>
+          </a:prstGeom>
+        </p:spPr>
+      </p:pic>
+    </p:spTree>
+    <p:extLst>
+      <p:ext uri="{BB962C8B-B14F-4D97-AF65-F5344CB8AC3E}">
+        <p14:creationId xmlns:p14="http://schemas.microsoft.com/office/powerpoint/2010/main" val="2027408710"/>
+      </p:ext>
+    </p:extLst>
+  </p:cSld>
+  <p:clrMapOvr>
+    <a:masterClrMapping/>
+  </p:clrMapOvr>
+</p:sld>
+</file>
+
+<file path=ppt/slides/slide4.xml><?xml version="1.0" encoding="utf-8"?>
+<p:sld xmlns:a="http://schemas.openxmlformats.org/drawingml/2006/main" xmlns:r="http://schemas.openxmlformats.org/officeDocument/2006/relationships" xmlns:p="http://schemas.openxmlformats.org/presentationml/2006/main">
+  <p:cSld>
+    <p:spTree>
+      <p:nvGrpSpPr>
+        <p:cNvPr id="1" name=""/>
+        <p:cNvGrpSpPr/>
+        <p:nvPr/>
+      </p:nvGrpSpPr>
+      <p:grpSpPr>
+        <a:xfrm>
+          <a:off x="0" y="0"/>
+          <a:ext cx="0" cy="0"/>
+          <a:chOff x="0" y="0"/>
+          <a:chExt cx="0" cy="0"/>
+        </a:xfrm>
+      </p:grpSpPr>
+      <p:sp>
+        <p:nvSpPr>
+          <p:cNvPr id="2" name="Title 1">
+            <a:extLst>
+              <a:ext uri="{FF2B5EF4-FFF2-40B4-BE49-F238E27FC236}">
+                <a16:creationId xmlns:a16="http://schemas.microsoft.com/office/drawing/2014/main" id="{1DC6E1D1-CE61-B541-98C4-4CDA85E5674E}"/>
+              </a:ext>
+            </a:extLst>
+          </p:cNvPr>
+          <p:cNvSpPr>
+            <a:spLocks noGrp="1"/>
+          </p:cNvSpPr>
+          <p:nvPr>
+            <p:ph type="title"/>
+          </p:nvPr>
+        </p:nvSpPr>
+        <p:spPr/>
+        <p:txBody>
+          <a:bodyPr/>
+          <a:lstStyle/>
+          <a:p>
+            <a:endParaRPr lang="en-US"/>
+          </a:p>
+        </p:txBody>
+      </p:sp>
+      <p:sp>
+        <p:nvSpPr>
+          <p:cNvPr id="3" name="Content Placeholder 2">
+            <a:extLst>
+              <a:ext uri="{FF2B5EF4-FFF2-40B4-BE49-F238E27FC236}">
+                <a16:creationId xmlns:a16="http://schemas.microsoft.com/office/drawing/2014/main" id="{D2C2A8E7-10E5-2946-A523-2A255662ECBB}"/>
+              </a:ext>
+            </a:extLst>
+          </p:cNvPr>
+          <p:cNvSpPr>
+            <a:spLocks noGrp="1"/>
+          </p:cNvSpPr>
+          <p:nvPr>
+            <p:ph idx="1"/>
+          </p:nvPr>
+        </p:nvSpPr>
+        <p:spPr>
+          <a:xfrm>
+            <a:off x="838200" y="4852219"/>
+            <a:ext cx="10515600" cy="1324744"/>
+          </a:xfrm>
+        </p:spPr>
+        <p:txBody>
+          <a:bodyPr/>
+          <a:lstStyle/>
+          <a:p>
+            <a:endParaRPr lang="en-US" dirty="0"/>
+          </a:p>
+        </p:txBody>
+      </p:sp>
+      <p:pic>
+        <p:nvPicPr>
+          <p:cNvPr id="5" name="Picture 4" descr="A picture containing text&#10;&#10;Description automatically generated">
+            <a:extLst>
+              <a:ext uri="{FF2B5EF4-FFF2-40B4-BE49-F238E27FC236}">
+                <a16:creationId xmlns:a16="http://schemas.microsoft.com/office/drawing/2014/main" id="{112889F7-DB85-8D45-BDFE-8FD2B5E92F4E}"/>
+              </a:ext>
+            </a:extLst>
+          </p:cNvPr>
+          <p:cNvPicPr>
+            <a:picLocks noChangeAspect="1"/>
+          </p:cNvPicPr>
+          <p:nvPr/>
+        </p:nvPicPr>
+        <p:blipFill>
+          <a:blip r:embed="rId2"/>
+          <a:stretch>
+            <a:fillRect/>
+          </a:stretch>
+        </p:blipFill>
+        <p:spPr>
+          <a:xfrm rot="9774961">
+            <a:off x="4826000" y="1981200"/>
+            <a:ext cx="2540000" cy="2895600"/>
+          </a:xfrm>
+          <a:prstGeom prst="rect">
+            <a:avLst/>
+          </a:prstGeom>
+        </p:spPr>
+      </p:pic>
+    </p:spTree>
+    <p:extLst>
+      <p:ext uri="{BB962C8B-B14F-4D97-AF65-F5344CB8AC3E}">
+        <p14:creationId xmlns:p14="http://schemas.microsoft.com/office/powerpoint/2010/main" val="2849712619"/>
+      </p:ext>
+    </p:extLst>
+  </p:cSld>
+  <p:clrMapOvr>
+    <a:masterClrMapping/>
+  </p:clrMapOvr>
+</p:sld>
+</file>
+
 <file path=ppt/theme/theme1.xml><?xml version="1.0" encoding="utf-8"?>
 <a:theme xmlns:a="http://schemas.openxmlformats.org/drawingml/2006/main" name="Office Theme">
   <a:themeElements>

</xml_diff>